<commit_message>
Revised documentation for AI_BALANCER
-- Added new SPAWN test missions.
-- Added new AI_BALANCER test missions.
-- Revised the MOOSE launch page.
</commit_message>
<xml_diff>
--- a/docs/Presentations/MOOSE.pptx
+++ b/docs/Presentations/MOOSE.pptx
@@ -293,7 +293,7 @@
           <a:p>
             <a:fld id="{96DFF08F-DC6B-4601-B491-B0F83F6DD2DA}" type="datetimeFigureOut">
               <a:rPr lang="en-US" dirty="0"/>
-              <a:t>1/9/2017</a:t>
+              <a:t>1/10/2017</a:t>
             </a:fld>
             <a:endParaRPr lang="en-US" dirty="0"/>
           </a:p>
@@ -505,7 +505,7 @@
           <a:p>
             <a:fld id="{96DFF08F-DC6B-4601-B491-B0F83F6DD2DA}" type="datetimeFigureOut">
               <a:rPr lang="en-US" dirty="0"/>
-              <a:t>1/9/2017</a:t>
+              <a:t>1/10/2017</a:t>
             </a:fld>
             <a:endParaRPr lang="en-US" dirty="0"/>
           </a:p>
@@ -742,7 +742,7 @@
           <a:p>
             <a:fld id="{96DFF08F-DC6B-4601-B491-B0F83F6DD2DA}" type="datetimeFigureOut">
               <a:rPr lang="en-US" dirty="0"/>
-              <a:t>1/9/2017</a:t>
+              <a:t>1/10/2017</a:t>
             </a:fld>
             <a:endParaRPr lang="en-US" dirty="0"/>
           </a:p>
@@ -952,7 +952,7 @@
           <a:p>
             <a:fld id="{96DFF08F-DC6B-4601-B491-B0F83F6DD2DA}" type="datetimeFigureOut">
               <a:rPr lang="en-US" dirty="0"/>
-              <a:t>1/9/2017</a:t>
+              <a:t>1/10/2017</a:t>
             </a:fld>
             <a:endParaRPr lang="en-US" dirty="0"/>
           </a:p>
@@ -1535,7 +1535,7 @@
           <a:p>
             <a:fld id="{96DFF08F-DC6B-4601-B491-B0F83F6DD2DA}" type="datetimeFigureOut">
               <a:rPr lang="en-US" dirty="0"/>
-              <a:t>1/9/2017</a:t>
+              <a:t>1/10/2017</a:t>
             </a:fld>
             <a:endParaRPr lang="en-US" dirty="0"/>
           </a:p>
@@ -1964,7 +1964,7 @@
           <a:p>
             <a:fld id="{96DFF08F-DC6B-4601-B491-B0F83F6DD2DA}" type="datetimeFigureOut">
               <a:rPr lang="en-US" dirty="0"/>
-              <a:t>1/9/2017</a:t>
+              <a:t>1/10/2017</a:t>
             </a:fld>
             <a:endParaRPr lang="en-US" dirty="0"/>
           </a:p>
@@ -2133,7 +2133,7 @@
           <a:p>
             <a:fld id="{96DFF08F-DC6B-4601-B491-B0F83F6DD2DA}" type="datetimeFigureOut">
               <a:rPr lang="en-US" dirty="0"/>
-              <a:t>1/9/2017</a:t>
+              <a:t>1/10/2017</a:t>
             </a:fld>
             <a:endParaRPr lang="en-US" dirty="0"/>
           </a:p>
@@ -2420,7 +2420,7 @@
           <a:p>
             <a:fld id="{96DFF08F-DC6B-4601-B491-B0F83F6DD2DA}" type="datetimeFigureOut">
               <a:rPr lang="en-US" dirty="0"/>
-              <a:t>1/9/2017</a:t>
+              <a:t>1/10/2017</a:t>
             </a:fld>
             <a:endParaRPr lang="en-US" dirty="0"/>
           </a:p>
@@ -2699,7 +2699,7 @@
           <a:p>
             <a:fld id="{96DFF08F-DC6B-4601-B491-B0F83F6DD2DA}" type="datetimeFigureOut">
               <a:rPr lang="en-US" dirty="0"/>
-              <a:t>1/9/2017</a:t>
+              <a:t>1/10/2017</a:t>
             </a:fld>
             <a:endParaRPr lang="en-US" dirty="0"/>
           </a:p>
@@ -2968,7 +2968,7 @@
             <a:fld id="{96DFF08F-DC6B-4601-B491-B0F83F6DD2DA}" type="datetimeFigureOut">
               <a:rPr lang="en-US" dirty="0"/>
               <a:pPr/>
-              <a:t>1/9/2017</a:t>
+              <a:t>1/10/2017</a:t>
             </a:fld>
             <a:endParaRPr lang="en-US" dirty="0"/>
           </a:p>
@@ -3492,7 +3492,11 @@
               <a:rPr lang="nl-BE" dirty="0"/>
             </a:br>
             <a:r>
-              <a:rPr lang="nl-BE" dirty="0"/>
+              <a:rPr lang="nl-BE" dirty="0">
+                <a:solidFill>
+                  <a:schemeClr val="accent1"/>
+                </a:solidFill>
+              </a:rPr>
               <a:t>OVERVIEW</a:t>
             </a:r>
           </a:p>
@@ -3723,7 +3727,7 @@
             <a:r>
               <a:rPr lang="nl-BE" sz="2000" b="1" dirty="0">
                 <a:solidFill>
-                  <a:schemeClr val="accent1"/>
+                  <a:schemeClr val="bg1"/>
                 </a:solidFill>
               </a:rPr>
               <a:t>DCS WORLD </a:t>
@@ -3731,7 +3735,7 @@
             <a:r>
               <a:rPr lang="nl-BE" sz="2000" b="1" dirty="0" err="1">
                 <a:solidFill>
-                  <a:schemeClr val="accent1"/>
+                  <a:schemeClr val="bg1"/>
                 </a:solidFill>
               </a:rPr>
               <a:t>core</a:t>
@@ -3739,7 +3743,7 @@
             <a:r>
               <a:rPr lang="nl-BE" sz="2000" b="1" dirty="0">
                 <a:solidFill>
-                  <a:schemeClr val="accent1"/>
+                  <a:schemeClr val="bg1"/>
                 </a:solidFill>
               </a:rPr>
               <a:t> </a:t>
@@ -3747,7 +3751,7 @@
             <a:r>
               <a:rPr lang="nl-BE" sz="2000" b="1" dirty="0" err="1">
                 <a:solidFill>
-                  <a:schemeClr val="accent1"/>
+                  <a:schemeClr val="bg1"/>
                 </a:solidFill>
               </a:rPr>
               <a:t>scripting</a:t>
@@ -3755,7 +3759,7 @@
             <a:r>
               <a:rPr lang="nl-BE" sz="2000" b="1" dirty="0">
                 <a:solidFill>
-                  <a:schemeClr val="accent1"/>
+                  <a:schemeClr val="bg1"/>
                 </a:solidFill>
               </a:rPr>
               <a:t> API</a:t>
@@ -3988,7 +3992,7 @@
         <p:spPr>
           <a:xfrm>
             <a:off x="7356014" y="2078985"/>
-            <a:ext cx="3420038" cy="1710019"/>
+            <a:ext cx="4500050" cy="1710019"/>
           </a:xfrm>
           <a:prstGeom prst="rect">
             <a:avLst/>
@@ -4131,8 +4135,8 @@
         </p:nvSpPr>
         <p:spPr>
           <a:xfrm>
-            <a:off x="7356014" y="4689014"/>
-            <a:ext cx="1104080" cy="270004"/>
+            <a:off x="7626016" y="4689014"/>
+            <a:ext cx="1350016" cy="270004"/>
           </a:xfrm>
           <a:prstGeom prst="rect">
             <a:avLst/>
@@ -4192,8 +4196,8 @@
         </p:nvSpPr>
         <p:spPr>
           <a:xfrm>
-            <a:off x="6996010" y="4329010"/>
-            <a:ext cx="1170013" cy="270004"/>
+            <a:off x="7356014" y="4329010"/>
+            <a:ext cx="1350015" cy="270004"/>
           </a:xfrm>
           <a:prstGeom prst="rect">
             <a:avLst/>
@@ -4248,8 +4252,8 @@
         </p:nvSpPr>
         <p:spPr>
           <a:xfrm>
-            <a:off x="8616028" y="4689014"/>
-            <a:ext cx="1104080" cy="270004"/>
+            <a:off x="9066033" y="4689014"/>
+            <a:ext cx="1260015" cy="270004"/>
           </a:xfrm>
           <a:prstGeom prst="rect">
             <a:avLst/>
@@ -4309,8 +4313,8 @@
         </p:nvSpPr>
         <p:spPr>
           <a:xfrm>
-            <a:off x="9876042" y="4689014"/>
-            <a:ext cx="1104080" cy="270004"/>
+            <a:off x="10416048" y="4689014"/>
+            <a:ext cx="1260015" cy="270004"/>
           </a:xfrm>
           <a:prstGeom prst="rect">
             <a:avLst/>
@@ -4370,8 +4374,8 @@
         </p:nvSpPr>
         <p:spPr>
           <a:xfrm>
-            <a:off x="5645995" y="4329010"/>
-            <a:ext cx="1170013" cy="270004"/>
+            <a:off x="5915998" y="4329010"/>
+            <a:ext cx="1350015" cy="270004"/>
           </a:xfrm>
           <a:prstGeom prst="rect">
             <a:avLst/>
@@ -4669,8 +4673,8 @@
         </p:nvSpPr>
         <p:spPr>
           <a:xfrm>
-            <a:off x="5105989" y="5409022"/>
-            <a:ext cx="990011" cy="720008"/>
+            <a:off x="4025977" y="5769026"/>
+            <a:ext cx="990011" cy="360004"/>
           </a:xfrm>
           <a:prstGeom prst="rect">
             <a:avLst/>
@@ -4725,8 +4729,8 @@
         </p:nvSpPr>
         <p:spPr>
           <a:xfrm>
-            <a:off x="6186001" y="5409022"/>
-            <a:ext cx="1260014" cy="720008"/>
+            <a:off x="7716018" y="5409022"/>
+            <a:ext cx="1440016" cy="720008"/>
           </a:xfrm>
           <a:prstGeom prst="rect">
             <a:avLst/>
@@ -4781,7 +4785,7 @@
         </p:nvSpPr>
         <p:spPr>
           <a:xfrm>
-            <a:off x="7536016" y="5409022"/>
+            <a:off x="9246035" y="5409022"/>
             <a:ext cx="1080012" cy="360004"/>
           </a:xfrm>
           <a:prstGeom prst="rect">
@@ -4837,8 +4841,8 @@
         </p:nvSpPr>
         <p:spPr>
           <a:xfrm>
-            <a:off x="8706029" y="5409022"/>
-            <a:ext cx="1260014" cy="360004"/>
+            <a:off x="10416048" y="5409022"/>
+            <a:ext cx="1260014" cy="720008"/>
           </a:xfrm>
           <a:prstGeom prst="rect">
             <a:avLst/>
@@ -4883,6 +4887,17 @@
               <a:t>MENU_COALITION, MENU_GROUP</a:t>
             </a:r>
           </a:p>
+          <a:p>
+            <a:pPr algn="ctr"/>
+            <a:r>
+              <a:rPr lang="nl-BE" sz="1000" b="1" dirty="0">
+                <a:solidFill>
+                  <a:schemeClr val="accent1"/>
+                </a:solidFill>
+              </a:rPr>
+              <a:t>MENU_...</a:t>
+            </a:r>
+          </a:p>
         </p:txBody>
       </p:sp>
       <p:sp>
@@ -4893,7 +4908,7 @@
         </p:nvSpPr>
         <p:spPr>
           <a:xfrm>
-            <a:off x="7536016" y="5859027"/>
+            <a:off x="9246035" y="5859027"/>
             <a:ext cx="1080012" cy="270003"/>
           </a:xfrm>
           <a:prstGeom prst="rect">
@@ -4949,8 +4964,8 @@
         </p:nvSpPr>
         <p:spPr>
           <a:xfrm>
-            <a:off x="10056044" y="5409022"/>
-            <a:ext cx="1620018" cy="720008"/>
+            <a:off x="5105989" y="5409022"/>
+            <a:ext cx="2520028" cy="720008"/>
           </a:xfrm>
           <a:prstGeom prst="rect">
             <a:avLst/>
@@ -5061,7 +5076,7 @@
         </p:nvSpPr>
         <p:spPr>
           <a:xfrm>
-            <a:off x="7536016" y="2708992"/>
+            <a:off x="8886031" y="2438989"/>
             <a:ext cx="1260014" cy="180002"/>
           </a:xfrm>
           <a:prstGeom prst="rect">
@@ -5111,14 +5126,14 @@
       </p:sp>
       <p:sp>
         <p:nvSpPr>
-          <p:cNvPr id="77" name="Rechthoek 76"/>
+          <p:cNvPr id="79" name="Rechthoek 78"/>
           <p:cNvSpPr/>
           <p:nvPr/>
         </p:nvSpPr>
         <p:spPr>
           <a:xfrm>
-            <a:off x="7536016" y="2978995"/>
-            <a:ext cx="1260014" cy="180002"/>
+            <a:off x="4025977" y="2438989"/>
+            <a:ext cx="1440016" cy="180002"/>
           </a:xfrm>
           <a:prstGeom prst="rect">
             <a:avLst/>
@@ -5160,20 +5175,20 @@
                   <a:schemeClr val="accent1"/>
                 </a:solidFill>
               </a:rPr>
-              <a:t>AI_CARGO</a:t>
-            </a:r>
-          </a:p>
-        </p:txBody>
-      </p:sp>
-      <p:sp>
-        <p:nvSpPr>
-          <p:cNvPr id="79" name="Rechthoek 78"/>
+              <a:t>COMMANDCENTER</a:t>
+            </a:r>
+          </a:p>
+        </p:txBody>
+      </p:sp>
+      <p:sp>
+        <p:nvSpPr>
+          <p:cNvPr id="81" name="Rechthoek 80"/>
           <p:cNvSpPr/>
           <p:nvPr/>
         </p:nvSpPr>
         <p:spPr>
           <a:xfrm>
-            <a:off x="4025977" y="2438989"/>
+            <a:off x="4025977" y="2708992"/>
             <a:ext cx="1440016" cy="180002"/>
           </a:xfrm>
           <a:prstGeom prst="rect">
@@ -5216,20 +5231,20 @@
                   <a:schemeClr val="accent1"/>
                 </a:solidFill>
               </a:rPr>
-              <a:t>COMMANDCENTER</a:t>
-            </a:r>
-          </a:p>
-        </p:txBody>
-      </p:sp>
-      <p:sp>
-        <p:nvSpPr>
-          <p:cNvPr id="81" name="Rechthoek 80"/>
+              <a:t>MISSION</a:t>
+            </a:r>
+          </a:p>
+        </p:txBody>
+      </p:sp>
+      <p:sp>
+        <p:nvSpPr>
+          <p:cNvPr id="82" name="Rechthoek 81"/>
           <p:cNvSpPr/>
           <p:nvPr/>
         </p:nvSpPr>
         <p:spPr>
           <a:xfrm>
-            <a:off x="4025977" y="2708992"/>
+            <a:off x="4025977" y="2978995"/>
             <a:ext cx="1440016" cy="180002"/>
           </a:xfrm>
           <a:prstGeom prst="rect">
@@ -5272,20 +5287,20 @@
                   <a:schemeClr val="accent1"/>
                 </a:solidFill>
               </a:rPr>
-              <a:t>MISSION</a:t>
-            </a:r>
-          </a:p>
-        </p:txBody>
-      </p:sp>
-      <p:sp>
-        <p:nvSpPr>
-          <p:cNvPr id="82" name="Rechthoek 81"/>
+              <a:t>TASK</a:t>
+            </a:r>
+          </a:p>
+        </p:txBody>
+      </p:sp>
+      <p:sp>
+        <p:nvSpPr>
+          <p:cNvPr id="83" name="Rechthoek 82"/>
           <p:cNvSpPr/>
           <p:nvPr/>
         </p:nvSpPr>
         <p:spPr>
           <a:xfrm>
-            <a:off x="4025977" y="2978995"/>
+            <a:off x="4025977" y="3248998"/>
             <a:ext cx="1440016" cy="180002"/>
           </a:xfrm>
           <a:prstGeom prst="rect">
@@ -5328,21 +5343,21 @@
                   <a:schemeClr val="accent1"/>
                 </a:solidFill>
               </a:rPr>
-              <a:t>TASK</a:t>
-            </a:r>
-          </a:p>
-        </p:txBody>
-      </p:sp>
-      <p:sp>
-        <p:nvSpPr>
-          <p:cNvPr id="83" name="Rechthoek 82"/>
+              <a:t>ACT(ION)</a:t>
+            </a:r>
+          </a:p>
+        </p:txBody>
+      </p:sp>
+      <p:sp>
+        <p:nvSpPr>
+          <p:cNvPr id="85" name="Rechthoek 84"/>
           <p:cNvSpPr/>
           <p:nvPr/>
         </p:nvSpPr>
         <p:spPr>
           <a:xfrm>
-            <a:off x="4025977" y="3248998"/>
-            <a:ext cx="1440016" cy="180002"/>
+            <a:off x="4025977" y="3519001"/>
+            <a:ext cx="3060034" cy="180002"/>
           </a:xfrm>
           <a:prstGeom prst="rect">
             <a:avLst/>
@@ -5384,21 +5399,21 @@
                   <a:schemeClr val="accent1"/>
                 </a:solidFill>
               </a:rPr>
-              <a:t>ACT(ION)</a:t>
-            </a:r>
-          </a:p>
-        </p:txBody>
-      </p:sp>
-      <p:sp>
-        <p:nvSpPr>
-          <p:cNvPr id="85" name="Rechthoek 84"/>
+              <a:t>TASKDISPATCHER</a:t>
+            </a:r>
+          </a:p>
+        </p:txBody>
+      </p:sp>
+      <p:sp>
+        <p:nvSpPr>
+          <p:cNvPr id="86" name="Rechthoek 85"/>
           <p:cNvSpPr/>
           <p:nvPr/>
         </p:nvSpPr>
         <p:spPr>
           <a:xfrm>
-            <a:off x="4025977" y="3519001"/>
-            <a:ext cx="3060034" cy="180002"/>
+            <a:off x="515938" y="2438989"/>
+            <a:ext cx="1440016" cy="180002"/>
           </a:xfrm>
           <a:prstGeom prst="rect">
             <a:avLst/>
@@ -5440,20 +5455,20 @@
                   <a:schemeClr val="accent1"/>
                 </a:solidFill>
               </a:rPr>
-              <a:t>TASKDISPATCHER</a:t>
-            </a:r>
-          </a:p>
-        </p:txBody>
-      </p:sp>
-      <p:sp>
-        <p:nvSpPr>
-          <p:cNvPr id="86" name="Rechthoek 85"/>
+              <a:t>SPAWN</a:t>
+            </a:r>
+          </a:p>
+        </p:txBody>
+      </p:sp>
+      <p:sp>
+        <p:nvSpPr>
+          <p:cNvPr id="87" name="Rechthoek 86"/>
           <p:cNvSpPr/>
           <p:nvPr/>
         </p:nvSpPr>
         <p:spPr>
           <a:xfrm>
-            <a:off x="515938" y="2438989"/>
+            <a:off x="515938" y="2708992"/>
             <a:ext cx="1440016" cy="180002"/>
           </a:xfrm>
           <a:prstGeom prst="rect">
@@ -5496,20 +5511,20 @@
                   <a:schemeClr val="accent1"/>
                 </a:solidFill>
               </a:rPr>
-              <a:t>SPAWN</a:t>
-            </a:r>
-          </a:p>
-        </p:txBody>
-      </p:sp>
-      <p:sp>
-        <p:nvSpPr>
-          <p:cNvPr id="87" name="Rechthoek 86"/>
+              <a:t>SEADDEFENSE</a:t>
+            </a:r>
+          </a:p>
+        </p:txBody>
+      </p:sp>
+      <p:sp>
+        <p:nvSpPr>
+          <p:cNvPr id="88" name="Rechthoek 87"/>
           <p:cNvSpPr/>
           <p:nvPr/>
         </p:nvSpPr>
         <p:spPr>
           <a:xfrm>
-            <a:off x="515938" y="2708992"/>
+            <a:off x="515938" y="2978995"/>
             <a:ext cx="1440016" cy="180002"/>
           </a:xfrm>
           <a:prstGeom prst="rect">
@@ -5552,20 +5567,20 @@
                   <a:schemeClr val="accent1"/>
                 </a:solidFill>
               </a:rPr>
-              <a:t>SEADDEFENSE</a:t>
-            </a:r>
-          </a:p>
-        </p:txBody>
-      </p:sp>
-      <p:sp>
-        <p:nvSpPr>
-          <p:cNvPr id="88" name="Rechthoek 87"/>
+              <a:t>ESCORT</a:t>
+            </a:r>
+          </a:p>
+        </p:txBody>
+      </p:sp>
+      <p:sp>
+        <p:nvSpPr>
+          <p:cNvPr id="89" name="Rechthoek 88"/>
           <p:cNvSpPr/>
           <p:nvPr/>
         </p:nvSpPr>
         <p:spPr>
           <a:xfrm>
-            <a:off x="515938" y="2978995"/>
+            <a:off x="515938" y="3248998"/>
             <a:ext cx="1440016" cy="180002"/>
           </a:xfrm>
           <a:prstGeom prst="rect">
@@ -5608,20 +5623,20 @@
                   <a:schemeClr val="accent1"/>
                 </a:solidFill>
               </a:rPr>
-              <a:t>ESCORT</a:t>
-            </a:r>
-          </a:p>
-        </p:txBody>
-      </p:sp>
-      <p:sp>
-        <p:nvSpPr>
-          <p:cNvPr id="89" name="Rechthoek 88"/>
+              <a:t>FOLLOW</a:t>
+            </a:r>
+          </a:p>
+        </p:txBody>
+      </p:sp>
+      <p:sp>
+        <p:nvSpPr>
+          <p:cNvPr id="90" name="Rechthoek 89"/>
           <p:cNvSpPr/>
           <p:nvPr/>
         </p:nvSpPr>
         <p:spPr>
           <a:xfrm>
-            <a:off x="515938" y="3248998"/>
+            <a:off x="515938" y="3519001"/>
             <a:ext cx="1440016" cy="180002"/>
           </a:xfrm>
           <a:prstGeom prst="rect">
@@ -5664,21 +5679,21 @@
                   <a:schemeClr val="accent1"/>
                 </a:solidFill>
               </a:rPr>
-              <a:t>FOLLOW</a:t>
-            </a:r>
-          </a:p>
-        </p:txBody>
-      </p:sp>
-      <p:sp>
-        <p:nvSpPr>
-          <p:cNvPr id="90" name="Rechthoek 89"/>
+              <a:t>DETECTION</a:t>
+            </a:r>
+          </a:p>
+        </p:txBody>
+      </p:sp>
+      <p:sp>
+        <p:nvSpPr>
+          <p:cNvPr id="92" name="Rechthoek 91"/>
           <p:cNvSpPr/>
           <p:nvPr/>
         </p:nvSpPr>
         <p:spPr>
           <a:xfrm>
-            <a:off x="515938" y="3519001"/>
-            <a:ext cx="1440016" cy="180002"/>
+            <a:off x="5555993" y="3248998"/>
+            <a:ext cx="1530017" cy="180002"/>
           </a:xfrm>
           <a:prstGeom prst="rect">
             <a:avLst/>
@@ -5720,20 +5735,20 @@
                   <a:schemeClr val="accent1"/>
                 </a:solidFill>
               </a:rPr>
-              <a:t>DETECTION</a:t>
-            </a:r>
-          </a:p>
-        </p:txBody>
-      </p:sp>
-      <p:sp>
-        <p:nvSpPr>
-          <p:cNvPr id="92" name="Rechthoek 91"/>
+              <a:t>ACT_ACCOUNT, …</a:t>
+            </a:r>
+          </a:p>
+        </p:txBody>
+      </p:sp>
+      <p:sp>
+        <p:nvSpPr>
+          <p:cNvPr id="93" name="Rechthoek 92"/>
           <p:cNvSpPr/>
           <p:nvPr/>
         </p:nvSpPr>
         <p:spPr>
           <a:xfrm>
-            <a:off x="5555993" y="3248998"/>
+            <a:off x="5555993" y="2978995"/>
             <a:ext cx="1530017" cy="180002"/>
           </a:xfrm>
           <a:prstGeom prst="rect">
@@ -5776,21 +5791,21 @@
                   <a:schemeClr val="accent1"/>
                 </a:solidFill>
               </a:rPr>
-              <a:t>ACT_ACCOUNT, …</a:t>
-            </a:r>
-          </a:p>
-        </p:txBody>
-      </p:sp>
-      <p:sp>
-        <p:nvSpPr>
-          <p:cNvPr id="93" name="Rechthoek 92"/>
+              <a:t>TASK_SEAD, …</a:t>
+            </a:r>
+          </a:p>
+        </p:txBody>
+      </p:sp>
+      <p:sp>
+        <p:nvSpPr>
+          <p:cNvPr id="94" name="Rechthoek 93"/>
           <p:cNvSpPr/>
           <p:nvPr/>
         </p:nvSpPr>
         <p:spPr>
           <a:xfrm>
-            <a:off x="5555993" y="2978995"/>
-            <a:ext cx="1530017" cy="180002"/>
+            <a:off x="2135956" y="2438989"/>
+            <a:ext cx="1440016" cy="180002"/>
           </a:xfrm>
           <a:prstGeom prst="rect">
             <a:avLst/>
@@ -5832,20 +5847,20 @@
                   <a:schemeClr val="accent1"/>
                 </a:solidFill>
               </a:rPr>
-              <a:t>TASK_SEAD, …</a:t>
-            </a:r>
-          </a:p>
-        </p:txBody>
-      </p:sp>
-      <p:sp>
-        <p:nvSpPr>
-          <p:cNvPr id="94" name="Rechthoek 93"/>
+              <a:t>MISSILETRAINER</a:t>
+            </a:r>
+          </a:p>
+        </p:txBody>
+      </p:sp>
+      <p:sp>
+        <p:nvSpPr>
+          <p:cNvPr id="95" name="Rechthoek 94"/>
           <p:cNvSpPr/>
           <p:nvPr/>
         </p:nvSpPr>
         <p:spPr>
           <a:xfrm>
-            <a:off x="2135956" y="2438989"/>
+            <a:off x="2135956" y="2708992"/>
             <a:ext cx="1440016" cy="180002"/>
           </a:xfrm>
           <a:prstGeom prst="rect">
@@ -5888,20 +5903,20 @@
                   <a:schemeClr val="accent1"/>
                 </a:solidFill>
               </a:rPr>
-              <a:t>MISSILETRAINER</a:t>
-            </a:r>
-          </a:p>
-        </p:txBody>
-      </p:sp>
-      <p:sp>
-        <p:nvSpPr>
-          <p:cNvPr id="95" name="Rechthoek 94"/>
+              <a:t>AIRBASEPOLICE</a:t>
+            </a:r>
+          </a:p>
+        </p:txBody>
+      </p:sp>
+      <p:sp>
+        <p:nvSpPr>
+          <p:cNvPr id="96" name="Rechthoek 95"/>
           <p:cNvSpPr/>
           <p:nvPr/>
         </p:nvSpPr>
         <p:spPr>
           <a:xfrm>
-            <a:off x="2135956" y="2708992"/>
+            <a:off x="2135956" y="2978995"/>
             <a:ext cx="1440016" cy="180002"/>
           </a:xfrm>
           <a:prstGeom prst="rect">
@@ -5944,21 +5959,127 @@
                   <a:schemeClr val="accent1"/>
                 </a:solidFill>
               </a:rPr>
-              <a:t>AIRBASEPOLICE</a:t>
-            </a:r>
-          </a:p>
-        </p:txBody>
-      </p:sp>
-      <p:sp>
-        <p:nvSpPr>
-          <p:cNvPr id="96" name="Rechthoek 95"/>
+              <a:t>CLEANUP</a:t>
+            </a:r>
+          </a:p>
+        </p:txBody>
+      </p:sp>
+      <p:sp>
+        <p:nvSpPr>
+          <p:cNvPr id="98" name="Rechthoek 97"/>
           <p:cNvSpPr/>
           <p:nvPr/>
         </p:nvSpPr>
         <p:spPr>
           <a:xfrm>
-            <a:off x="2135956" y="2978995"/>
-            <a:ext cx="1440016" cy="180002"/>
+            <a:off x="515938" y="4329011"/>
+            <a:ext cx="1710020" cy="630006"/>
+          </a:xfrm>
+          <a:prstGeom prst="rect">
+            <a:avLst/>
+          </a:prstGeom>
+          <a:solidFill>
+            <a:schemeClr val="tx1"/>
+          </a:solidFill>
+          <a:ln w="19050">
+            <a:solidFill>
+              <a:schemeClr val="accent1"/>
+            </a:solidFill>
+          </a:ln>
+        </p:spPr>
+        <p:style>
+          <a:lnRef idx="2">
+            <a:schemeClr val="accent1"/>
+          </a:lnRef>
+          <a:fillRef idx="1">
+            <a:schemeClr val="lt1"/>
+          </a:fillRef>
+          <a:effectRef idx="0">
+            <a:schemeClr val="accent1"/>
+          </a:effectRef>
+          <a:fontRef idx="minor">
+            <a:schemeClr val="dk1"/>
+          </a:fontRef>
+        </p:style>
+        <p:txBody>
+          <a:bodyPr rtlCol="0" anchor="ctr"/>
+          <a:lstStyle/>
+          <a:p>
+            <a:pPr algn="ctr"/>
+            <a:r>
+              <a:rPr lang="nl-BE" sz="1400" b="1" dirty="0">
+                <a:solidFill>
+                  <a:schemeClr val="accent1"/>
+                </a:solidFill>
+              </a:rPr>
+              <a:t>OBJECT</a:t>
+            </a:r>
+          </a:p>
+        </p:txBody>
+      </p:sp>
+      <p:sp>
+        <p:nvSpPr>
+          <p:cNvPr id="99" name="Rechthoek 98"/>
+          <p:cNvSpPr/>
+          <p:nvPr/>
+        </p:nvSpPr>
+        <p:spPr>
+          <a:xfrm>
+            <a:off x="2315958" y="4329010"/>
+            <a:ext cx="1710020" cy="630006"/>
+          </a:xfrm>
+          <a:prstGeom prst="rect">
+            <a:avLst/>
+          </a:prstGeom>
+          <a:solidFill>
+            <a:srgbClr val="D1EBFF"/>
+          </a:solidFill>
+          <a:ln w="19050">
+            <a:solidFill>
+              <a:schemeClr val="accent1"/>
+            </a:solidFill>
+          </a:ln>
+        </p:spPr>
+        <p:style>
+          <a:lnRef idx="2">
+            <a:schemeClr val="accent1"/>
+          </a:lnRef>
+          <a:fillRef idx="1">
+            <a:schemeClr val="lt1"/>
+          </a:fillRef>
+          <a:effectRef idx="0">
+            <a:schemeClr val="accent1"/>
+          </a:effectRef>
+          <a:fontRef idx="minor">
+            <a:schemeClr val="dk1"/>
+          </a:fontRef>
+        </p:style>
+        <p:txBody>
+          <a:bodyPr rtlCol="0" anchor="ctr"/>
+          <a:lstStyle/>
+          <a:p>
+            <a:pPr algn="ctr"/>
+            <a:r>
+              <a:rPr lang="nl-BE" sz="1400" b="1" dirty="0">
+                <a:solidFill>
+                  <a:schemeClr val="accent1"/>
+                </a:solidFill>
+              </a:rPr>
+              <a:t>IDENTIFIABLE</a:t>
+            </a:r>
+          </a:p>
+        </p:txBody>
+      </p:sp>
+      <p:sp>
+        <p:nvSpPr>
+          <p:cNvPr id="100" name="Rechthoek 99"/>
+          <p:cNvSpPr/>
+          <p:nvPr/>
+        </p:nvSpPr>
+        <p:spPr>
+          <a:xfrm>
+            <a:off x="4115978" y="4329010"/>
+            <a:ext cx="1710020" cy="630006"/>
           </a:xfrm>
           <a:prstGeom prst="rect">
             <a:avLst/>
@@ -5995,32 +6116,35 @@
           <a:p>
             <a:pPr algn="ctr"/>
             <a:r>
-              <a:rPr lang="nl-BE" sz="1100" b="1" dirty="0">
+              <a:rPr lang="nl-BE" sz="1400" b="1" dirty="0">
                 <a:solidFill>
                   <a:schemeClr val="accent1"/>
                 </a:solidFill>
               </a:rPr>
-              <a:t>CLEANUP</a:t>
-            </a:r>
-          </a:p>
-        </p:txBody>
-      </p:sp>
-      <p:sp>
-        <p:nvSpPr>
-          <p:cNvPr id="98" name="Rechthoek 97"/>
+              <a:t>POSITIONABLE</a:t>
+            </a:r>
+          </a:p>
+        </p:txBody>
+      </p:sp>
+      <p:sp>
+        <p:nvSpPr>
+          <p:cNvPr id="101" name="Rechthoek 100"/>
           <p:cNvSpPr/>
           <p:nvPr/>
         </p:nvSpPr>
         <p:spPr>
           <a:xfrm>
-            <a:off x="515938" y="4329011"/>
-            <a:ext cx="1530017" cy="630006"/>
+            <a:off x="5915999" y="4689014"/>
+            <a:ext cx="1620018" cy="270002"/>
           </a:xfrm>
           <a:prstGeom prst="rect">
             <a:avLst/>
           </a:prstGeom>
           <a:solidFill>
-            <a:schemeClr val="tx1"/>
+            <a:schemeClr val="accent1">
+              <a:lumMod val="40000"/>
+              <a:lumOff val="60000"/>
+            </a:schemeClr>
           </a:solidFill>
           <a:ln w="19050">
             <a:solidFill>
@@ -6053,74 +6177,21 @@
                   <a:schemeClr val="accent1"/>
                 </a:solidFill>
               </a:rPr>
-              <a:t>OBJECT</a:t>
-            </a:r>
-          </a:p>
-        </p:txBody>
-      </p:sp>
-      <p:sp>
-        <p:nvSpPr>
-          <p:cNvPr id="99" name="Rechthoek 98"/>
+              <a:t>CONTROLLABLE</a:t>
+            </a:r>
+          </a:p>
+        </p:txBody>
+      </p:sp>
+      <p:sp>
+        <p:nvSpPr>
+          <p:cNvPr id="46" name="Rechthoek 45"/>
           <p:cNvSpPr/>
           <p:nvPr/>
         </p:nvSpPr>
         <p:spPr>
           <a:xfrm>
-            <a:off x="2225957" y="4329010"/>
-            <a:ext cx="1530017" cy="630006"/>
-          </a:xfrm>
-          <a:prstGeom prst="rect">
-            <a:avLst/>
-          </a:prstGeom>
-          <a:solidFill>
-            <a:srgbClr val="D1EBFF"/>
-          </a:solidFill>
-          <a:ln w="19050">
-            <a:solidFill>
-              <a:schemeClr val="accent1"/>
-            </a:solidFill>
-          </a:ln>
-        </p:spPr>
-        <p:style>
-          <a:lnRef idx="2">
-            <a:schemeClr val="accent1"/>
-          </a:lnRef>
-          <a:fillRef idx="1">
-            <a:schemeClr val="lt1"/>
-          </a:fillRef>
-          <a:effectRef idx="0">
-            <a:schemeClr val="accent1"/>
-          </a:effectRef>
-          <a:fontRef idx="minor">
-            <a:schemeClr val="dk1"/>
-          </a:fontRef>
-        </p:style>
-        <p:txBody>
-          <a:bodyPr rtlCol="0" anchor="ctr"/>
-          <a:lstStyle/>
-          <a:p>
-            <a:pPr algn="ctr"/>
-            <a:r>
-              <a:rPr lang="nl-BE" sz="1400" b="1" dirty="0">
-                <a:solidFill>
-                  <a:schemeClr val="accent1"/>
-                </a:solidFill>
-              </a:rPr>
-              <a:t>IDENTIFIABLE</a:t>
-            </a:r>
-          </a:p>
-        </p:txBody>
-      </p:sp>
-      <p:sp>
-        <p:nvSpPr>
-          <p:cNvPr id="100" name="Rechthoek 99"/>
-          <p:cNvSpPr/>
-          <p:nvPr/>
-        </p:nvSpPr>
-        <p:spPr>
-          <a:xfrm>
-            <a:off x="3935976" y="4329010"/>
-            <a:ext cx="1530017" cy="630006"/>
+            <a:off x="10236046" y="2708992"/>
+            <a:ext cx="1260014" cy="180002"/>
           </a:xfrm>
           <a:prstGeom prst="rect">
             <a:avLst/>
@@ -6157,34 +6228,34 @@
           <a:p>
             <a:pPr algn="ctr"/>
             <a:r>
-              <a:rPr lang="nl-BE" sz="1400" b="1" dirty="0">
+              <a:rPr lang="nl-BE" sz="1100" b="1" dirty="0">
                 <a:solidFill>
                   <a:schemeClr val="accent1"/>
                 </a:solidFill>
               </a:rPr>
-              <a:t>POSITIONABLE</a:t>
-            </a:r>
-          </a:p>
-        </p:txBody>
-      </p:sp>
-      <p:sp>
-        <p:nvSpPr>
-          <p:cNvPr id="101" name="Rechthoek 100"/>
+              <a:t>AI_PICKUP</a:t>
+            </a:r>
+          </a:p>
+        </p:txBody>
+      </p:sp>
+      <p:sp>
+        <p:nvSpPr>
+          <p:cNvPr id="49" name="Rechthoek 48"/>
           <p:cNvSpPr/>
           <p:nvPr/>
         </p:nvSpPr>
         <p:spPr>
           <a:xfrm>
-            <a:off x="5645995" y="4689014"/>
-            <a:ext cx="1530017" cy="270002"/>
+            <a:off x="10236046" y="2978995"/>
+            <a:ext cx="1260014" cy="180002"/>
           </a:xfrm>
           <a:prstGeom prst="rect">
             <a:avLst/>
           </a:prstGeom>
           <a:solidFill>
             <a:schemeClr val="accent1">
-              <a:lumMod val="40000"/>
-              <a:lumOff val="60000"/>
+              <a:lumMod val="20000"/>
+              <a:lumOff val="80000"/>
             </a:schemeClr>
           </a:solidFill>
           <a:ln w="19050">
@@ -6213,12 +6284,180 @@
           <a:p>
             <a:pPr algn="ctr"/>
             <a:r>
-              <a:rPr lang="nl-BE" sz="1400" b="1" dirty="0">
+              <a:rPr lang="nl-BE" sz="1100" b="1" dirty="0">
                 <a:solidFill>
                   <a:schemeClr val="accent1"/>
                 </a:solidFill>
               </a:rPr>
-              <a:t>CONTROLLABLE</a:t>
+              <a:t>AI_DEPLOY</a:t>
+            </a:r>
+          </a:p>
+        </p:txBody>
+      </p:sp>
+      <p:sp>
+        <p:nvSpPr>
+          <p:cNvPr id="52" name="Rechthoek 51"/>
+          <p:cNvSpPr/>
+          <p:nvPr/>
+        </p:nvSpPr>
+        <p:spPr>
+          <a:xfrm>
+            <a:off x="8886031" y="2708992"/>
+            <a:ext cx="1260014" cy="180002"/>
+          </a:xfrm>
+          <a:prstGeom prst="rect">
+            <a:avLst/>
+          </a:prstGeom>
+          <a:solidFill>
+            <a:schemeClr val="accent1">
+              <a:lumMod val="20000"/>
+              <a:lumOff val="80000"/>
+            </a:schemeClr>
+          </a:solidFill>
+          <a:ln w="19050">
+            <a:solidFill>
+              <a:schemeClr val="accent1"/>
+            </a:solidFill>
+          </a:ln>
+        </p:spPr>
+        <p:style>
+          <a:lnRef idx="2">
+            <a:schemeClr val="accent1"/>
+          </a:lnRef>
+          <a:fillRef idx="1">
+            <a:schemeClr val="lt1"/>
+          </a:fillRef>
+          <a:effectRef idx="0">
+            <a:schemeClr val="accent1"/>
+          </a:effectRef>
+          <a:fontRef idx="minor">
+            <a:schemeClr val="dk1"/>
+          </a:fontRef>
+        </p:style>
+        <p:txBody>
+          <a:bodyPr rtlCol="0" anchor="ctr"/>
+          <a:lstStyle/>
+          <a:p>
+            <a:pPr algn="ctr"/>
+            <a:r>
+              <a:rPr lang="nl-BE" sz="1100" b="1" dirty="0">
+                <a:solidFill>
+                  <a:schemeClr val="accent1"/>
+                </a:solidFill>
+              </a:rPr>
+              <a:t>AI_INTERCEPT</a:t>
+            </a:r>
+          </a:p>
+        </p:txBody>
+      </p:sp>
+      <p:sp>
+        <p:nvSpPr>
+          <p:cNvPr id="53" name="Rechthoek 52"/>
+          <p:cNvSpPr/>
+          <p:nvPr/>
+        </p:nvSpPr>
+        <p:spPr>
+          <a:xfrm>
+            <a:off x="10236046" y="2438989"/>
+            <a:ext cx="1260014" cy="180002"/>
+          </a:xfrm>
+          <a:prstGeom prst="rect">
+            <a:avLst/>
+          </a:prstGeom>
+          <a:solidFill>
+            <a:schemeClr val="accent1">
+              <a:lumMod val="20000"/>
+              <a:lumOff val="80000"/>
+            </a:schemeClr>
+          </a:solidFill>
+          <a:ln w="19050">
+            <a:solidFill>
+              <a:schemeClr val="accent1"/>
+            </a:solidFill>
+          </a:ln>
+        </p:spPr>
+        <p:style>
+          <a:lnRef idx="2">
+            <a:schemeClr val="accent1"/>
+          </a:lnRef>
+          <a:fillRef idx="1">
+            <a:schemeClr val="lt1"/>
+          </a:fillRef>
+          <a:effectRef idx="0">
+            <a:schemeClr val="accent1"/>
+          </a:effectRef>
+          <a:fontRef idx="minor">
+            <a:schemeClr val="dk1"/>
+          </a:fontRef>
+        </p:style>
+        <p:txBody>
+          <a:bodyPr rtlCol="0" anchor="ctr"/>
+          <a:lstStyle/>
+          <a:p>
+            <a:pPr algn="ctr"/>
+            <a:r>
+              <a:rPr lang="nl-BE" sz="1100" b="1" dirty="0">
+                <a:solidFill>
+                  <a:schemeClr val="accent1"/>
+                </a:solidFill>
+              </a:rPr>
+              <a:t>AI_CARGO</a:t>
+            </a:r>
+          </a:p>
+        </p:txBody>
+      </p:sp>
+      <p:sp>
+        <p:nvSpPr>
+          <p:cNvPr id="54" name="Rechthoek 53"/>
+          <p:cNvSpPr/>
+          <p:nvPr/>
+        </p:nvSpPr>
+        <p:spPr>
+          <a:xfrm>
+            <a:off x="7536016" y="2708992"/>
+            <a:ext cx="1260014" cy="180002"/>
+          </a:xfrm>
+          <a:prstGeom prst="rect">
+            <a:avLst/>
+          </a:prstGeom>
+          <a:solidFill>
+            <a:schemeClr val="accent1">
+              <a:lumMod val="20000"/>
+              <a:lumOff val="80000"/>
+            </a:schemeClr>
+          </a:solidFill>
+          <a:ln w="19050">
+            <a:solidFill>
+              <a:schemeClr val="accent1"/>
+            </a:solidFill>
+          </a:ln>
+        </p:spPr>
+        <p:style>
+          <a:lnRef idx="2">
+            <a:schemeClr val="accent1"/>
+          </a:lnRef>
+          <a:fillRef idx="1">
+            <a:schemeClr val="lt1"/>
+          </a:fillRef>
+          <a:effectRef idx="0">
+            <a:schemeClr val="accent1"/>
+          </a:effectRef>
+          <a:fontRef idx="minor">
+            <a:schemeClr val="dk1"/>
+          </a:fontRef>
+        </p:style>
+        <p:txBody>
+          <a:bodyPr rtlCol="0" anchor="ctr"/>
+          <a:lstStyle/>
+          <a:p>
+            <a:pPr algn="ctr"/>
+            <a:r>
+              <a:rPr lang="nl-BE" sz="1100" b="1" dirty="0">
+                <a:solidFill>
+                  <a:schemeClr val="accent1"/>
+                </a:solidFill>
+              </a:rPr>
+              <a:t>AI_...</a:t>
             </a:r>
           </a:p>
         </p:txBody>

</xml_diff>